<commit_message>
Still needs lots of changes (And map)
</commit_message>
<xml_diff>
--- a/The Kirilling Presentation (Unfinished).pptx
+++ b/The Kirilling Presentation (Unfinished).pptx
@@ -112,6 +112,11 @@
       </a:defRPr>
     </a:lvl9pPr>
   </p:defaultTextStyle>
+  <p:extLst>
+    <p:ext uri="{EFAFB233-063F-42B5-8137-9DF3F51BA10A}">
+      <p15:sldGuideLst xmlns:p15="http://schemas.microsoft.com/office/powerpoint/2012/main"/>
+    </p:ext>
+  </p:extLst>
 </p:presentation>
 </file>
 
@@ -3896,8 +3901,22 @@
           <a:p>
             <a:r>
               <a:rPr lang="en-GB" dirty="0" smtClean="0"/>
-              <a:t>Team 4</a:t>
-            </a:r>
+              <a:t>Team </a:t>
+            </a:r>
+            <a:r>
+              <a:rPr lang="en-GB" dirty="0" smtClean="0"/>
+              <a:t>4</a:t>
+            </a:r>
+          </a:p>
+          <a:p>
+            <a:endParaRPr lang="en-GB" dirty="0"/>
+          </a:p>
+          <a:p>
+            <a:r>
+              <a:rPr lang="en-GB" dirty="0" smtClean="0"/>
+              <a:t>(NOT FINISHED, NEEDS TO BE REDESIGNED)</a:t>
+            </a:r>
+            <a:endParaRPr lang="en-GB" dirty="0" smtClean="0"/>
           </a:p>
           <a:p>
             <a:endParaRPr lang="en-GB" dirty="0"/>

</xml_diff>